<commit_message>
finished constraint section of presentation
</commit_message>
<xml_diff>
--- a/Data Inceptionists.pptx
+++ b/Data Inceptionists.pptx
@@ -9,6 +9,10 @@
     <p:sldId id="257" r:id="rId3"/>
     <p:sldId id="258" r:id="rId4"/>
     <p:sldId id="259" r:id="rId5"/>
+    <p:sldId id="260" r:id="rId6"/>
+    <p:sldId id="261" r:id="rId7"/>
+    <p:sldId id="262" r:id="rId8"/>
+    <p:sldId id="263" r:id="rId9"/>
   </p:sldIdLst>
   <p:sldSz cx="12192000" cy="6858000"/>
   <p:notesSz cx="6858000" cy="9144000"/>
@@ -107,6 +111,11 @@
       </a:defRPr>
     </a:lvl9pPr>
   </p:defaultTextStyle>
+  <p:extLst>
+    <p:ext uri="{EFAFB233-063F-42B5-8137-9DF3F51BA10A}">
+      <p15:sldGuideLst xmlns:p15="http://schemas.microsoft.com/office/powerpoint/2012/main"/>
+    </p:ext>
+  </p:extLst>
 </p:presentation>
 </file>
 
@@ -3332,10 +3341,590 @@
           </a:p>
         </p:txBody>
       </p:sp>
+      <p:pic>
+        <p:nvPicPr>
+          <p:cNvPr id="3" name="Picture 2"/>
+          <p:cNvPicPr>
+            <a:picLocks noChangeAspect="1"/>
+          </p:cNvPicPr>
+          <p:nvPr/>
+        </p:nvPicPr>
+        <p:blipFill rotWithShape="1">
+          <a:blip r:embed="rId2">
+            <a:extLst>
+              <a:ext uri="{28A0092B-C50C-407E-A947-70E740481C1C}">
+                <a14:useLocalDpi xmlns:a14="http://schemas.microsoft.com/office/drawing/2010/main" val="0"/>
+              </a:ext>
+            </a:extLst>
+          </a:blip>
+          <a:srcRect l="73677" t="51682" r="557" b="472"/>
+          <a:stretch/>
+        </p:blipFill>
+        <p:spPr>
+          <a:xfrm>
+            <a:off x="2136296" y="1865213"/>
+            <a:ext cx="1872733" cy="3281321"/>
+          </a:xfrm>
+          <a:prstGeom prst="rect">
+            <a:avLst/>
+          </a:prstGeom>
+        </p:spPr>
+      </p:pic>
+      <p:pic>
+        <p:nvPicPr>
+          <p:cNvPr id="4" name="Picture 3"/>
+          <p:cNvPicPr>
+            <a:picLocks noChangeAspect="1"/>
+          </p:cNvPicPr>
+          <p:nvPr/>
+        </p:nvPicPr>
+        <p:blipFill rotWithShape="1">
+          <a:blip r:embed="rId3">
+            <a:extLst>
+              <a:ext uri="{28A0092B-C50C-407E-A947-70E740481C1C}">
+                <a14:useLocalDpi xmlns:a14="http://schemas.microsoft.com/office/drawing/2010/main" val="0"/>
+              </a:ext>
+            </a:extLst>
+          </a:blip>
+          <a:srcRect t="-118" b="52684"/>
+          <a:stretch/>
+        </p:blipFill>
+        <p:spPr>
+          <a:xfrm>
+            <a:off x="4866261" y="1893536"/>
+            <a:ext cx="4854721" cy="3252998"/>
+          </a:xfrm>
+          <a:prstGeom prst="rect">
+            <a:avLst/>
+          </a:prstGeom>
+        </p:spPr>
+      </p:pic>
     </p:spTree>
     <p:extLst>
       <p:ext uri="{BB962C8B-B14F-4D97-AF65-F5344CB8AC3E}">
         <p14:creationId xmlns:p14="http://schemas.microsoft.com/office/powerpoint/2010/main" val="2150866245"/>
+      </p:ext>
+    </p:extLst>
+  </p:cSld>
+  <p:clrMapOvr>
+    <a:masterClrMapping/>
+  </p:clrMapOvr>
+</p:sld>
+</file>
+
+<file path=ppt/slides/slide5.xml><?xml version="1.0" encoding="utf-8"?>
+<p:sld xmlns:a="http://schemas.openxmlformats.org/drawingml/2006/main" xmlns:r="http://schemas.openxmlformats.org/officeDocument/2006/relationships" xmlns:p="http://schemas.openxmlformats.org/presentationml/2006/main">
+  <p:cSld>
+    <p:spTree>
+      <p:nvGrpSpPr>
+        <p:cNvPr id="1" name=""/>
+        <p:cNvGrpSpPr/>
+        <p:nvPr/>
+      </p:nvGrpSpPr>
+      <p:grpSpPr>
+        <a:xfrm>
+          <a:off x="0" y="0"/>
+          <a:ext cx="0" cy="0"/>
+          <a:chOff x="0" y="0"/>
+          <a:chExt cx="0" cy="0"/>
+        </a:xfrm>
+      </p:grpSpPr>
+      <p:sp>
+        <p:nvSpPr>
+          <p:cNvPr id="2" name="Title 1"/>
+          <p:cNvSpPr>
+            <a:spLocks noGrp="1"/>
+          </p:cNvSpPr>
+          <p:nvPr>
+            <p:ph type="title"/>
+          </p:nvPr>
+        </p:nvSpPr>
+        <p:spPr>
+          <a:xfrm>
+            <a:off x="838200" y="284206"/>
+            <a:ext cx="10515600" cy="694932"/>
+          </a:xfrm>
+        </p:spPr>
+        <p:txBody>
+          <a:bodyPr>
+            <a:normAutofit/>
+          </a:bodyPr>
+          <a:lstStyle/>
+          <a:p>
+            <a:pPr algn="ctr"/>
+            <a:r>
+              <a:rPr lang="en-US" sz="3200" b="1" dirty="0" smtClean="0">
+                <a:latin typeface="+mn-lt"/>
+              </a:rPr>
+              <a:t>Reviews/Ratings</a:t>
+            </a:r>
+            <a:endParaRPr lang="en-US" sz="3200" b="1" dirty="0">
+              <a:latin typeface="+mn-lt"/>
+            </a:endParaRPr>
+          </a:p>
+        </p:txBody>
+      </p:sp>
+      <p:pic>
+        <p:nvPicPr>
+          <p:cNvPr id="3" name="Picture 2"/>
+          <p:cNvPicPr>
+            <a:picLocks noChangeAspect="1"/>
+          </p:cNvPicPr>
+          <p:nvPr/>
+        </p:nvPicPr>
+        <p:blipFill rotWithShape="1">
+          <a:blip r:embed="rId2">
+            <a:extLst>
+              <a:ext uri="{28A0092B-C50C-407E-A947-70E740481C1C}">
+                <a14:useLocalDpi xmlns:a14="http://schemas.microsoft.com/office/drawing/2010/main" val="0"/>
+              </a:ext>
+            </a:extLst>
+          </a:blip>
+          <a:srcRect b="68023"/>
+          <a:stretch/>
+        </p:blipFill>
+        <p:spPr>
+          <a:xfrm>
+            <a:off x="147630" y="2500439"/>
+            <a:ext cx="4670080" cy="2192942"/>
+          </a:xfrm>
+          <a:prstGeom prst="rect">
+            <a:avLst/>
+          </a:prstGeom>
+        </p:spPr>
+      </p:pic>
+      <p:pic>
+        <p:nvPicPr>
+          <p:cNvPr id="5" name="Picture 4"/>
+          <p:cNvPicPr>
+            <a:picLocks noChangeAspect="1"/>
+          </p:cNvPicPr>
+          <p:nvPr/>
+        </p:nvPicPr>
+        <p:blipFill>
+          <a:blip r:embed="rId3">
+            <a:extLst>
+              <a:ext uri="{28A0092B-C50C-407E-A947-70E740481C1C}">
+                <a14:useLocalDpi xmlns:a14="http://schemas.microsoft.com/office/drawing/2010/main" val="0"/>
+              </a:ext>
+            </a:extLst>
+          </a:blip>
+          <a:stretch>
+            <a:fillRect/>
+          </a:stretch>
+        </p:blipFill>
+        <p:spPr>
+          <a:xfrm>
+            <a:off x="0" y="4828216"/>
+            <a:ext cx="9286292" cy="1816883"/>
+          </a:xfrm>
+          <a:prstGeom prst="rect">
+            <a:avLst/>
+          </a:prstGeom>
+        </p:spPr>
+      </p:pic>
+      <p:pic>
+        <p:nvPicPr>
+          <p:cNvPr id="6" name="Picture 5"/>
+          <p:cNvPicPr>
+            <a:picLocks noChangeAspect="1"/>
+          </p:cNvPicPr>
+          <p:nvPr/>
+        </p:nvPicPr>
+        <p:blipFill rotWithShape="1">
+          <a:blip r:embed="rId4">
+            <a:extLst>
+              <a:ext uri="{28A0092B-C50C-407E-A947-70E740481C1C}">
+                <a14:useLocalDpi xmlns:a14="http://schemas.microsoft.com/office/drawing/2010/main" val="0"/>
+              </a:ext>
+            </a:extLst>
+          </a:blip>
+          <a:srcRect t="37522"/>
+          <a:stretch/>
+        </p:blipFill>
+        <p:spPr>
+          <a:xfrm>
+            <a:off x="4460633" y="2160572"/>
+            <a:ext cx="7268198" cy="4284733"/>
+          </a:xfrm>
+          <a:prstGeom prst="rect">
+            <a:avLst/>
+          </a:prstGeom>
+        </p:spPr>
+      </p:pic>
+    </p:spTree>
+    <p:extLst>
+      <p:ext uri="{BB962C8B-B14F-4D97-AF65-F5344CB8AC3E}">
+        <p14:creationId xmlns:p14="http://schemas.microsoft.com/office/powerpoint/2010/main" val="1113876056"/>
+      </p:ext>
+    </p:extLst>
+  </p:cSld>
+  <p:clrMapOvr>
+    <a:masterClrMapping/>
+  </p:clrMapOvr>
+</p:sld>
+</file>
+
+<file path=ppt/slides/slide6.xml><?xml version="1.0" encoding="utf-8"?>
+<p:sld xmlns:a="http://schemas.openxmlformats.org/drawingml/2006/main" xmlns:r="http://schemas.openxmlformats.org/officeDocument/2006/relationships" xmlns:p="http://schemas.openxmlformats.org/presentationml/2006/main">
+  <p:cSld>
+    <p:spTree>
+      <p:nvGrpSpPr>
+        <p:cNvPr id="1" name=""/>
+        <p:cNvGrpSpPr/>
+        <p:nvPr/>
+      </p:nvGrpSpPr>
+      <p:grpSpPr>
+        <a:xfrm>
+          <a:off x="0" y="0"/>
+          <a:ext cx="0" cy="0"/>
+          <a:chOff x="0" y="0"/>
+          <a:chExt cx="0" cy="0"/>
+        </a:xfrm>
+      </p:grpSpPr>
+      <p:sp>
+        <p:nvSpPr>
+          <p:cNvPr id="2" name="Title 1"/>
+          <p:cNvSpPr>
+            <a:spLocks noGrp="1"/>
+          </p:cNvSpPr>
+          <p:nvPr>
+            <p:ph type="title"/>
+          </p:nvPr>
+        </p:nvSpPr>
+        <p:spPr>
+          <a:xfrm>
+            <a:off x="611623" y="251837"/>
+            <a:ext cx="10515600" cy="662563"/>
+          </a:xfrm>
+        </p:spPr>
+        <p:txBody>
+          <a:bodyPr>
+            <a:normAutofit/>
+          </a:bodyPr>
+          <a:lstStyle/>
+          <a:p>
+            <a:pPr algn="ctr"/>
+            <a:r>
+              <a:rPr lang="en-US" sz="3200" b="1" dirty="0" smtClean="0">
+                <a:latin typeface="+mn-lt"/>
+              </a:rPr>
+              <a:t>Items and their Categories</a:t>
+            </a:r>
+            <a:endParaRPr lang="en-US" sz="3200" b="1" dirty="0">
+              <a:latin typeface="+mn-lt"/>
+            </a:endParaRPr>
+          </a:p>
+        </p:txBody>
+      </p:sp>
+      <p:pic>
+        <p:nvPicPr>
+          <p:cNvPr id="3" name="Picture 2"/>
+          <p:cNvPicPr>
+            <a:picLocks noChangeAspect="1"/>
+          </p:cNvPicPr>
+          <p:nvPr/>
+        </p:nvPicPr>
+        <p:blipFill rotWithShape="1">
+          <a:blip r:embed="rId2">
+            <a:extLst>
+              <a:ext uri="{28A0092B-C50C-407E-A947-70E740481C1C}">
+                <a14:useLocalDpi xmlns:a14="http://schemas.microsoft.com/office/drawing/2010/main" val="0"/>
+              </a:ext>
+            </a:extLst>
+          </a:blip>
+          <a:srcRect t="59233"/>
+          <a:stretch/>
+        </p:blipFill>
+        <p:spPr>
+          <a:xfrm>
+            <a:off x="6237123" y="2678464"/>
+            <a:ext cx="4670080" cy="2795798"/>
+          </a:xfrm>
+          <a:prstGeom prst="rect">
+            <a:avLst/>
+          </a:prstGeom>
+        </p:spPr>
+      </p:pic>
+      <p:pic>
+        <p:nvPicPr>
+          <p:cNvPr id="4" name="Picture 3"/>
+          <p:cNvPicPr>
+            <a:picLocks noChangeAspect="1"/>
+          </p:cNvPicPr>
+          <p:nvPr/>
+        </p:nvPicPr>
+        <p:blipFill rotWithShape="1">
+          <a:blip r:embed="rId3">
+            <a:extLst>
+              <a:ext uri="{28A0092B-C50C-407E-A947-70E740481C1C}">
+                <a14:useLocalDpi xmlns:a14="http://schemas.microsoft.com/office/drawing/2010/main" val="0"/>
+              </a:ext>
+            </a:extLst>
+          </a:blip>
+          <a:srcRect r="72781" b="41562"/>
+          <a:stretch/>
+        </p:blipFill>
+        <p:spPr>
+          <a:xfrm>
+            <a:off x="1539224" y="1108608"/>
+            <a:ext cx="2531070" cy="5127403"/>
+          </a:xfrm>
+          <a:prstGeom prst="rect">
+            <a:avLst/>
+          </a:prstGeom>
+        </p:spPr>
+      </p:pic>
+    </p:spTree>
+    <p:extLst>
+      <p:ext uri="{BB962C8B-B14F-4D97-AF65-F5344CB8AC3E}">
+        <p14:creationId xmlns:p14="http://schemas.microsoft.com/office/powerpoint/2010/main" val="3455921825"/>
+      </p:ext>
+    </p:extLst>
+  </p:cSld>
+  <p:clrMapOvr>
+    <a:masterClrMapping/>
+  </p:clrMapOvr>
+</p:sld>
+</file>
+
+<file path=ppt/slides/slide7.xml><?xml version="1.0" encoding="utf-8"?>
+<p:sld xmlns:a="http://schemas.openxmlformats.org/drawingml/2006/main" xmlns:r="http://schemas.openxmlformats.org/officeDocument/2006/relationships" xmlns:p="http://schemas.openxmlformats.org/presentationml/2006/main">
+  <p:cSld>
+    <p:spTree>
+      <p:nvGrpSpPr>
+        <p:cNvPr id="1" name=""/>
+        <p:cNvGrpSpPr/>
+        <p:nvPr/>
+      </p:nvGrpSpPr>
+      <p:grpSpPr>
+        <a:xfrm>
+          <a:off x="0" y="0"/>
+          <a:ext cx="0" cy="0"/>
+          <a:chOff x="0" y="0"/>
+          <a:chExt cx="0" cy="0"/>
+        </a:xfrm>
+      </p:grpSpPr>
+      <p:sp>
+        <p:nvSpPr>
+          <p:cNvPr id="2" name="Title 1"/>
+          <p:cNvSpPr>
+            <a:spLocks noGrp="1"/>
+          </p:cNvSpPr>
+          <p:nvPr>
+            <p:ph type="title"/>
+          </p:nvPr>
+        </p:nvSpPr>
+        <p:spPr>
+          <a:xfrm>
+            <a:off x="757279" y="235654"/>
+            <a:ext cx="10515600" cy="686840"/>
+          </a:xfrm>
+        </p:spPr>
+        <p:txBody>
+          <a:bodyPr>
+            <a:normAutofit/>
+          </a:bodyPr>
+          <a:lstStyle/>
+          <a:p>
+            <a:pPr algn="ctr"/>
+            <a:r>
+              <a:rPr lang="en-US" sz="3200" b="1" dirty="0" smtClean="0">
+                <a:latin typeface="+mn-lt"/>
+              </a:rPr>
+              <a:t>Auctions and Bids</a:t>
+            </a:r>
+            <a:endParaRPr lang="en-US" sz="3200" b="1" dirty="0">
+              <a:latin typeface="+mn-lt"/>
+            </a:endParaRPr>
+          </a:p>
+        </p:txBody>
+      </p:sp>
+      <p:pic>
+        <p:nvPicPr>
+          <p:cNvPr id="4" name="Picture 3"/>
+          <p:cNvPicPr>
+            <a:picLocks noChangeAspect="1"/>
+          </p:cNvPicPr>
+          <p:nvPr/>
+        </p:nvPicPr>
+        <p:blipFill rotWithShape="1">
+          <a:blip r:embed="rId2">
+            <a:extLst>
+              <a:ext uri="{28A0092B-C50C-407E-A947-70E740481C1C}">
+                <a14:useLocalDpi xmlns:a14="http://schemas.microsoft.com/office/drawing/2010/main" val="0"/>
+              </a:ext>
+            </a:extLst>
+          </a:blip>
+          <a:srcRect l="-111" t="-236" r="111" b="34041"/>
+          <a:stretch/>
+        </p:blipFill>
+        <p:spPr>
+          <a:xfrm>
+            <a:off x="325604" y="1051966"/>
+            <a:ext cx="7268198" cy="4539632"/>
+          </a:xfrm>
+          <a:prstGeom prst="rect">
+            <a:avLst/>
+          </a:prstGeom>
+        </p:spPr>
+      </p:pic>
+      <p:pic>
+        <p:nvPicPr>
+          <p:cNvPr id="3" name="Picture 2"/>
+          <p:cNvPicPr>
+            <a:picLocks noChangeAspect="1"/>
+          </p:cNvPicPr>
+          <p:nvPr/>
+        </p:nvPicPr>
+        <p:blipFill rotWithShape="1">
+          <a:blip r:embed="rId3">
+            <a:extLst>
+              <a:ext uri="{28A0092B-C50C-407E-A947-70E740481C1C}">
+                <a14:useLocalDpi xmlns:a14="http://schemas.microsoft.com/office/drawing/2010/main" val="0"/>
+              </a:ext>
+            </a:extLst>
+          </a:blip>
+          <a:srcRect b="36432"/>
+          <a:stretch/>
+        </p:blipFill>
+        <p:spPr>
+          <a:xfrm>
+            <a:off x="6285320" y="922494"/>
+            <a:ext cx="5581076" cy="3762797"/>
+          </a:xfrm>
+          <a:prstGeom prst="rect">
+            <a:avLst/>
+          </a:prstGeom>
+        </p:spPr>
+      </p:pic>
+    </p:spTree>
+    <p:extLst>
+      <p:ext uri="{BB962C8B-B14F-4D97-AF65-F5344CB8AC3E}">
+        <p14:creationId xmlns:p14="http://schemas.microsoft.com/office/powerpoint/2010/main" val="3153776350"/>
+      </p:ext>
+    </p:extLst>
+  </p:cSld>
+  <p:clrMapOvr>
+    <a:masterClrMapping/>
+  </p:clrMapOvr>
+</p:sld>
+</file>
+
+<file path=ppt/slides/slide8.xml><?xml version="1.0" encoding="utf-8"?>
+<p:sld xmlns:a="http://schemas.openxmlformats.org/drawingml/2006/main" xmlns:r="http://schemas.openxmlformats.org/officeDocument/2006/relationships" xmlns:p="http://schemas.openxmlformats.org/presentationml/2006/main">
+  <p:cSld>
+    <p:spTree>
+      <p:nvGrpSpPr>
+        <p:cNvPr id="1" name=""/>
+        <p:cNvGrpSpPr/>
+        <p:nvPr/>
+      </p:nvGrpSpPr>
+      <p:grpSpPr>
+        <a:xfrm>
+          <a:off x="0" y="0"/>
+          <a:ext cx="0" cy="0"/>
+          <a:chOff x="0" y="0"/>
+          <a:chExt cx="0" cy="0"/>
+        </a:xfrm>
+      </p:grpSpPr>
+      <p:sp>
+        <p:nvSpPr>
+          <p:cNvPr id="2" name="Title 1"/>
+          <p:cNvSpPr>
+            <a:spLocks noGrp="1"/>
+          </p:cNvSpPr>
+          <p:nvPr>
+            <p:ph type="title"/>
+          </p:nvPr>
+        </p:nvSpPr>
+        <p:spPr>
+          <a:xfrm>
+            <a:off x="668267" y="300389"/>
+            <a:ext cx="10515600" cy="605919"/>
+          </a:xfrm>
+        </p:spPr>
+        <p:txBody>
+          <a:bodyPr>
+            <a:normAutofit/>
+          </a:bodyPr>
+          <a:lstStyle/>
+          <a:p>
+            <a:pPr algn="ctr"/>
+            <a:r>
+              <a:rPr lang="en-US" sz="3200" b="1" dirty="0" smtClean="0">
+                <a:latin typeface="+mn-lt"/>
+              </a:rPr>
+              <a:t>Credit Cards</a:t>
+            </a:r>
+            <a:endParaRPr lang="en-US" sz="3200" b="1" dirty="0">
+              <a:latin typeface="+mn-lt"/>
+            </a:endParaRPr>
+          </a:p>
+        </p:txBody>
+      </p:sp>
+      <p:pic>
+        <p:nvPicPr>
+          <p:cNvPr id="3" name="Picture 2"/>
+          <p:cNvPicPr>
+            <a:picLocks noChangeAspect="1"/>
+          </p:cNvPicPr>
+          <p:nvPr/>
+        </p:nvPicPr>
+        <p:blipFill rotWithShape="1">
+          <a:blip r:embed="rId2">
+            <a:extLst>
+              <a:ext uri="{28A0092B-C50C-407E-A947-70E740481C1C}">
+                <a14:useLocalDpi xmlns:a14="http://schemas.microsoft.com/office/drawing/2010/main" val="0"/>
+              </a:ext>
+            </a:extLst>
+          </a:blip>
+          <a:srcRect l="79355" t="7197" r="-1621" b="30620"/>
+          <a:stretch/>
+        </p:blipFill>
+        <p:spPr>
+          <a:xfrm>
+            <a:off x="3139709" y="1173345"/>
+            <a:ext cx="1618407" cy="4264504"/>
+          </a:xfrm>
+          <a:prstGeom prst="rect">
+            <a:avLst/>
+          </a:prstGeom>
+        </p:spPr>
+      </p:pic>
+      <p:pic>
+        <p:nvPicPr>
+          <p:cNvPr id="4" name="Picture 3"/>
+          <p:cNvPicPr>
+            <a:picLocks noChangeAspect="1"/>
+          </p:cNvPicPr>
+          <p:nvPr/>
+        </p:nvPicPr>
+        <p:blipFill rotWithShape="1">
+          <a:blip r:embed="rId3">
+            <a:extLst>
+              <a:ext uri="{28A0092B-C50C-407E-A947-70E740481C1C}">
+                <a14:useLocalDpi xmlns:a14="http://schemas.microsoft.com/office/drawing/2010/main" val="0"/>
+              </a:ext>
+            </a:extLst>
+          </a:blip>
+          <a:srcRect t="64028"/>
+          <a:stretch/>
+        </p:blipFill>
+        <p:spPr>
+          <a:xfrm>
+            <a:off x="5784168" y="2346689"/>
+            <a:ext cx="6466114" cy="2464025"/>
+          </a:xfrm>
+          <a:prstGeom prst="rect">
+            <a:avLst/>
+          </a:prstGeom>
+        </p:spPr>
+      </p:pic>
+    </p:spTree>
+    <p:extLst>
+      <p:ext uri="{BB962C8B-B14F-4D97-AF65-F5344CB8AC3E}">
+        <p14:creationId xmlns:p14="http://schemas.microsoft.com/office/powerpoint/2010/main" val="1828239924"/>
       </p:ext>
     </p:extLst>
   </p:cSld>

</xml_diff>

<commit_message>
I have to do this again for some reason
</commit_message>
<xml_diff>
--- a/Data Inceptionists.pptx
+++ b/Data Inceptionists.pptx
@@ -9,6 +9,10 @@
     <p:sldId id="257" r:id="rId3"/>
     <p:sldId id="258" r:id="rId4"/>
     <p:sldId id="259" r:id="rId5"/>
+    <p:sldId id="260" r:id="rId6"/>
+    <p:sldId id="261" r:id="rId7"/>
+    <p:sldId id="262" r:id="rId8"/>
+    <p:sldId id="263" r:id="rId9"/>
   </p:sldIdLst>
   <p:sldSz cx="12192000" cy="6858000"/>
   <p:notesSz cx="6858000" cy="9144000"/>
@@ -107,6 +111,11 @@
       </a:defRPr>
     </a:lvl9pPr>
   </p:defaultTextStyle>
+  <p:extLst>
+    <p:ext uri="{EFAFB233-063F-42B5-8137-9DF3F51BA10A}">
+      <p15:sldGuideLst xmlns:p15="http://schemas.microsoft.com/office/powerpoint/2012/main"/>
+    </p:ext>
+  </p:extLst>
 </p:presentation>
 </file>
 
@@ -3332,10 +3341,590 @@
           </a:p>
         </p:txBody>
       </p:sp>
+      <p:pic>
+        <p:nvPicPr>
+          <p:cNvPr id="3" name="Picture 2"/>
+          <p:cNvPicPr>
+            <a:picLocks noChangeAspect="1"/>
+          </p:cNvPicPr>
+          <p:nvPr/>
+        </p:nvPicPr>
+        <p:blipFill rotWithShape="1">
+          <a:blip r:embed="rId2">
+            <a:extLst>
+              <a:ext uri="{28A0092B-C50C-407E-A947-70E740481C1C}">
+                <a14:useLocalDpi xmlns:a14="http://schemas.microsoft.com/office/drawing/2010/main" val="0"/>
+              </a:ext>
+            </a:extLst>
+          </a:blip>
+          <a:srcRect l="73677" t="51682" r="557" b="472"/>
+          <a:stretch/>
+        </p:blipFill>
+        <p:spPr>
+          <a:xfrm>
+            <a:off x="2136296" y="1865213"/>
+            <a:ext cx="1872733" cy="3281321"/>
+          </a:xfrm>
+          <a:prstGeom prst="rect">
+            <a:avLst/>
+          </a:prstGeom>
+        </p:spPr>
+      </p:pic>
+      <p:pic>
+        <p:nvPicPr>
+          <p:cNvPr id="4" name="Picture 3"/>
+          <p:cNvPicPr>
+            <a:picLocks noChangeAspect="1"/>
+          </p:cNvPicPr>
+          <p:nvPr/>
+        </p:nvPicPr>
+        <p:blipFill rotWithShape="1">
+          <a:blip r:embed="rId3">
+            <a:extLst>
+              <a:ext uri="{28A0092B-C50C-407E-A947-70E740481C1C}">
+                <a14:useLocalDpi xmlns:a14="http://schemas.microsoft.com/office/drawing/2010/main" val="0"/>
+              </a:ext>
+            </a:extLst>
+          </a:blip>
+          <a:srcRect t="-118" b="52684"/>
+          <a:stretch/>
+        </p:blipFill>
+        <p:spPr>
+          <a:xfrm>
+            <a:off x="4866261" y="1893536"/>
+            <a:ext cx="4854721" cy="3252998"/>
+          </a:xfrm>
+          <a:prstGeom prst="rect">
+            <a:avLst/>
+          </a:prstGeom>
+        </p:spPr>
+      </p:pic>
     </p:spTree>
     <p:extLst>
       <p:ext uri="{BB962C8B-B14F-4D97-AF65-F5344CB8AC3E}">
         <p14:creationId xmlns:p14="http://schemas.microsoft.com/office/powerpoint/2010/main" val="2150866245"/>
+      </p:ext>
+    </p:extLst>
+  </p:cSld>
+  <p:clrMapOvr>
+    <a:masterClrMapping/>
+  </p:clrMapOvr>
+</p:sld>
+</file>
+
+<file path=ppt/slides/slide5.xml><?xml version="1.0" encoding="utf-8"?>
+<p:sld xmlns:a="http://schemas.openxmlformats.org/drawingml/2006/main" xmlns:r="http://schemas.openxmlformats.org/officeDocument/2006/relationships" xmlns:p="http://schemas.openxmlformats.org/presentationml/2006/main">
+  <p:cSld>
+    <p:spTree>
+      <p:nvGrpSpPr>
+        <p:cNvPr id="1" name=""/>
+        <p:cNvGrpSpPr/>
+        <p:nvPr/>
+      </p:nvGrpSpPr>
+      <p:grpSpPr>
+        <a:xfrm>
+          <a:off x="0" y="0"/>
+          <a:ext cx="0" cy="0"/>
+          <a:chOff x="0" y="0"/>
+          <a:chExt cx="0" cy="0"/>
+        </a:xfrm>
+      </p:grpSpPr>
+      <p:sp>
+        <p:nvSpPr>
+          <p:cNvPr id="2" name="Title 1"/>
+          <p:cNvSpPr>
+            <a:spLocks noGrp="1"/>
+          </p:cNvSpPr>
+          <p:nvPr>
+            <p:ph type="title"/>
+          </p:nvPr>
+        </p:nvSpPr>
+        <p:spPr>
+          <a:xfrm>
+            <a:off x="838200" y="284206"/>
+            <a:ext cx="10515600" cy="694932"/>
+          </a:xfrm>
+        </p:spPr>
+        <p:txBody>
+          <a:bodyPr>
+            <a:normAutofit/>
+          </a:bodyPr>
+          <a:lstStyle/>
+          <a:p>
+            <a:pPr algn="ctr"/>
+            <a:r>
+              <a:rPr lang="en-US" sz="3200" b="1" dirty="0" smtClean="0">
+                <a:latin typeface="+mn-lt"/>
+              </a:rPr>
+              <a:t>Reviews/Ratings</a:t>
+            </a:r>
+            <a:endParaRPr lang="en-US" sz="3200" b="1" dirty="0">
+              <a:latin typeface="+mn-lt"/>
+            </a:endParaRPr>
+          </a:p>
+        </p:txBody>
+      </p:sp>
+      <p:pic>
+        <p:nvPicPr>
+          <p:cNvPr id="3" name="Picture 2"/>
+          <p:cNvPicPr>
+            <a:picLocks noChangeAspect="1"/>
+          </p:cNvPicPr>
+          <p:nvPr/>
+        </p:nvPicPr>
+        <p:blipFill rotWithShape="1">
+          <a:blip r:embed="rId2">
+            <a:extLst>
+              <a:ext uri="{28A0092B-C50C-407E-A947-70E740481C1C}">
+                <a14:useLocalDpi xmlns:a14="http://schemas.microsoft.com/office/drawing/2010/main" val="0"/>
+              </a:ext>
+            </a:extLst>
+          </a:blip>
+          <a:srcRect b="68023"/>
+          <a:stretch/>
+        </p:blipFill>
+        <p:spPr>
+          <a:xfrm>
+            <a:off x="147630" y="2500439"/>
+            <a:ext cx="4670080" cy="2192942"/>
+          </a:xfrm>
+          <a:prstGeom prst="rect">
+            <a:avLst/>
+          </a:prstGeom>
+        </p:spPr>
+      </p:pic>
+      <p:pic>
+        <p:nvPicPr>
+          <p:cNvPr id="5" name="Picture 4"/>
+          <p:cNvPicPr>
+            <a:picLocks noChangeAspect="1"/>
+          </p:cNvPicPr>
+          <p:nvPr/>
+        </p:nvPicPr>
+        <p:blipFill>
+          <a:blip r:embed="rId3">
+            <a:extLst>
+              <a:ext uri="{28A0092B-C50C-407E-A947-70E740481C1C}">
+                <a14:useLocalDpi xmlns:a14="http://schemas.microsoft.com/office/drawing/2010/main" val="0"/>
+              </a:ext>
+            </a:extLst>
+          </a:blip>
+          <a:stretch>
+            <a:fillRect/>
+          </a:stretch>
+        </p:blipFill>
+        <p:spPr>
+          <a:xfrm>
+            <a:off x="0" y="4828216"/>
+            <a:ext cx="9286292" cy="1816883"/>
+          </a:xfrm>
+          <a:prstGeom prst="rect">
+            <a:avLst/>
+          </a:prstGeom>
+        </p:spPr>
+      </p:pic>
+      <p:pic>
+        <p:nvPicPr>
+          <p:cNvPr id="6" name="Picture 5"/>
+          <p:cNvPicPr>
+            <a:picLocks noChangeAspect="1"/>
+          </p:cNvPicPr>
+          <p:nvPr/>
+        </p:nvPicPr>
+        <p:blipFill rotWithShape="1">
+          <a:blip r:embed="rId4">
+            <a:extLst>
+              <a:ext uri="{28A0092B-C50C-407E-A947-70E740481C1C}">
+                <a14:useLocalDpi xmlns:a14="http://schemas.microsoft.com/office/drawing/2010/main" val="0"/>
+              </a:ext>
+            </a:extLst>
+          </a:blip>
+          <a:srcRect t="37522"/>
+          <a:stretch/>
+        </p:blipFill>
+        <p:spPr>
+          <a:xfrm>
+            <a:off x="4460633" y="2160572"/>
+            <a:ext cx="7268198" cy="4284733"/>
+          </a:xfrm>
+          <a:prstGeom prst="rect">
+            <a:avLst/>
+          </a:prstGeom>
+        </p:spPr>
+      </p:pic>
+    </p:spTree>
+    <p:extLst>
+      <p:ext uri="{BB962C8B-B14F-4D97-AF65-F5344CB8AC3E}">
+        <p14:creationId xmlns:p14="http://schemas.microsoft.com/office/powerpoint/2010/main" val="1113876056"/>
+      </p:ext>
+    </p:extLst>
+  </p:cSld>
+  <p:clrMapOvr>
+    <a:masterClrMapping/>
+  </p:clrMapOvr>
+</p:sld>
+</file>
+
+<file path=ppt/slides/slide6.xml><?xml version="1.0" encoding="utf-8"?>
+<p:sld xmlns:a="http://schemas.openxmlformats.org/drawingml/2006/main" xmlns:r="http://schemas.openxmlformats.org/officeDocument/2006/relationships" xmlns:p="http://schemas.openxmlformats.org/presentationml/2006/main">
+  <p:cSld>
+    <p:spTree>
+      <p:nvGrpSpPr>
+        <p:cNvPr id="1" name=""/>
+        <p:cNvGrpSpPr/>
+        <p:nvPr/>
+      </p:nvGrpSpPr>
+      <p:grpSpPr>
+        <a:xfrm>
+          <a:off x="0" y="0"/>
+          <a:ext cx="0" cy="0"/>
+          <a:chOff x="0" y="0"/>
+          <a:chExt cx="0" cy="0"/>
+        </a:xfrm>
+      </p:grpSpPr>
+      <p:sp>
+        <p:nvSpPr>
+          <p:cNvPr id="2" name="Title 1"/>
+          <p:cNvSpPr>
+            <a:spLocks noGrp="1"/>
+          </p:cNvSpPr>
+          <p:nvPr>
+            <p:ph type="title"/>
+          </p:nvPr>
+        </p:nvSpPr>
+        <p:spPr>
+          <a:xfrm>
+            <a:off x="611623" y="251837"/>
+            <a:ext cx="10515600" cy="662563"/>
+          </a:xfrm>
+        </p:spPr>
+        <p:txBody>
+          <a:bodyPr>
+            <a:normAutofit/>
+          </a:bodyPr>
+          <a:lstStyle/>
+          <a:p>
+            <a:pPr algn="ctr"/>
+            <a:r>
+              <a:rPr lang="en-US" sz="3200" b="1" dirty="0" smtClean="0">
+                <a:latin typeface="+mn-lt"/>
+              </a:rPr>
+              <a:t>Items and their Categories</a:t>
+            </a:r>
+            <a:endParaRPr lang="en-US" sz="3200" b="1" dirty="0">
+              <a:latin typeface="+mn-lt"/>
+            </a:endParaRPr>
+          </a:p>
+        </p:txBody>
+      </p:sp>
+      <p:pic>
+        <p:nvPicPr>
+          <p:cNvPr id="3" name="Picture 2"/>
+          <p:cNvPicPr>
+            <a:picLocks noChangeAspect="1"/>
+          </p:cNvPicPr>
+          <p:nvPr/>
+        </p:nvPicPr>
+        <p:blipFill rotWithShape="1">
+          <a:blip r:embed="rId2">
+            <a:extLst>
+              <a:ext uri="{28A0092B-C50C-407E-A947-70E740481C1C}">
+                <a14:useLocalDpi xmlns:a14="http://schemas.microsoft.com/office/drawing/2010/main" val="0"/>
+              </a:ext>
+            </a:extLst>
+          </a:blip>
+          <a:srcRect t="59233"/>
+          <a:stretch/>
+        </p:blipFill>
+        <p:spPr>
+          <a:xfrm>
+            <a:off x="6237123" y="2678464"/>
+            <a:ext cx="4670080" cy="2795798"/>
+          </a:xfrm>
+          <a:prstGeom prst="rect">
+            <a:avLst/>
+          </a:prstGeom>
+        </p:spPr>
+      </p:pic>
+      <p:pic>
+        <p:nvPicPr>
+          <p:cNvPr id="4" name="Picture 3"/>
+          <p:cNvPicPr>
+            <a:picLocks noChangeAspect="1"/>
+          </p:cNvPicPr>
+          <p:nvPr/>
+        </p:nvPicPr>
+        <p:blipFill rotWithShape="1">
+          <a:blip r:embed="rId3">
+            <a:extLst>
+              <a:ext uri="{28A0092B-C50C-407E-A947-70E740481C1C}">
+                <a14:useLocalDpi xmlns:a14="http://schemas.microsoft.com/office/drawing/2010/main" val="0"/>
+              </a:ext>
+            </a:extLst>
+          </a:blip>
+          <a:srcRect r="72781" b="41562"/>
+          <a:stretch/>
+        </p:blipFill>
+        <p:spPr>
+          <a:xfrm>
+            <a:off x="1539224" y="1108608"/>
+            <a:ext cx="2531070" cy="5127403"/>
+          </a:xfrm>
+          <a:prstGeom prst="rect">
+            <a:avLst/>
+          </a:prstGeom>
+        </p:spPr>
+      </p:pic>
+    </p:spTree>
+    <p:extLst>
+      <p:ext uri="{BB962C8B-B14F-4D97-AF65-F5344CB8AC3E}">
+        <p14:creationId xmlns:p14="http://schemas.microsoft.com/office/powerpoint/2010/main" val="3455921825"/>
+      </p:ext>
+    </p:extLst>
+  </p:cSld>
+  <p:clrMapOvr>
+    <a:masterClrMapping/>
+  </p:clrMapOvr>
+</p:sld>
+</file>
+
+<file path=ppt/slides/slide7.xml><?xml version="1.0" encoding="utf-8"?>
+<p:sld xmlns:a="http://schemas.openxmlformats.org/drawingml/2006/main" xmlns:r="http://schemas.openxmlformats.org/officeDocument/2006/relationships" xmlns:p="http://schemas.openxmlformats.org/presentationml/2006/main">
+  <p:cSld>
+    <p:spTree>
+      <p:nvGrpSpPr>
+        <p:cNvPr id="1" name=""/>
+        <p:cNvGrpSpPr/>
+        <p:nvPr/>
+      </p:nvGrpSpPr>
+      <p:grpSpPr>
+        <a:xfrm>
+          <a:off x="0" y="0"/>
+          <a:ext cx="0" cy="0"/>
+          <a:chOff x="0" y="0"/>
+          <a:chExt cx="0" cy="0"/>
+        </a:xfrm>
+      </p:grpSpPr>
+      <p:sp>
+        <p:nvSpPr>
+          <p:cNvPr id="2" name="Title 1"/>
+          <p:cNvSpPr>
+            <a:spLocks noGrp="1"/>
+          </p:cNvSpPr>
+          <p:nvPr>
+            <p:ph type="title"/>
+          </p:nvPr>
+        </p:nvSpPr>
+        <p:spPr>
+          <a:xfrm>
+            <a:off x="757279" y="235654"/>
+            <a:ext cx="10515600" cy="686840"/>
+          </a:xfrm>
+        </p:spPr>
+        <p:txBody>
+          <a:bodyPr>
+            <a:normAutofit/>
+          </a:bodyPr>
+          <a:lstStyle/>
+          <a:p>
+            <a:pPr algn="ctr"/>
+            <a:r>
+              <a:rPr lang="en-US" sz="3200" b="1" dirty="0" smtClean="0">
+                <a:latin typeface="+mn-lt"/>
+              </a:rPr>
+              <a:t>Auctions and Bids</a:t>
+            </a:r>
+            <a:endParaRPr lang="en-US" sz="3200" b="1" dirty="0">
+              <a:latin typeface="+mn-lt"/>
+            </a:endParaRPr>
+          </a:p>
+        </p:txBody>
+      </p:sp>
+      <p:pic>
+        <p:nvPicPr>
+          <p:cNvPr id="4" name="Picture 3"/>
+          <p:cNvPicPr>
+            <a:picLocks noChangeAspect="1"/>
+          </p:cNvPicPr>
+          <p:nvPr/>
+        </p:nvPicPr>
+        <p:blipFill rotWithShape="1">
+          <a:blip r:embed="rId2">
+            <a:extLst>
+              <a:ext uri="{28A0092B-C50C-407E-A947-70E740481C1C}">
+                <a14:useLocalDpi xmlns:a14="http://schemas.microsoft.com/office/drawing/2010/main" val="0"/>
+              </a:ext>
+            </a:extLst>
+          </a:blip>
+          <a:srcRect l="-111" t="-236" r="111" b="34041"/>
+          <a:stretch/>
+        </p:blipFill>
+        <p:spPr>
+          <a:xfrm>
+            <a:off x="325604" y="1051966"/>
+            <a:ext cx="7268198" cy="4539632"/>
+          </a:xfrm>
+          <a:prstGeom prst="rect">
+            <a:avLst/>
+          </a:prstGeom>
+        </p:spPr>
+      </p:pic>
+      <p:pic>
+        <p:nvPicPr>
+          <p:cNvPr id="3" name="Picture 2"/>
+          <p:cNvPicPr>
+            <a:picLocks noChangeAspect="1"/>
+          </p:cNvPicPr>
+          <p:nvPr/>
+        </p:nvPicPr>
+        <p:blipFill rotWithShape="1">
+          <a:blip r:embed="rId3">
+            <a:extLst>
+              <a:ext uri="{28A0092B-C50C-407E-A947-70E740481C1C}">
+                <a14:useLocalDpi xmlns:a14="http://schemas.microsoft.com/office/drawing/2010/main" val="0"/>
+              </a:ext>
+            </a:extLst>
+          </a:blip>
+          <a:srcRect b="36432"/>
+          <a:stretch/>
+        </p:blipFill>
+        <p:spPr>
+          <a:xfrm>
+            <a:off x="6285320" y="922494"/>
+            <a:ext cx="5581076" cy="3762797"/>
+          </a:xfrm>
+          <a:prstGeom prst="rect">
+            <a:avLst/>
+          </a:prstGeom>
+        </p:spPr>
+      </p:pic>
+    </p:spTree>
+    <p:extLst>
+      <p:ext uri="{BB962C8B-B14F-4D97-AF65-F5344CB8AC3E}">
+        <p14:creationId xmlns:p14="http://schemas.microsoft.com/office/powerpoint/2010/main" val="3153776350"/>
+      </p:ext>
+    </p:extLst>
+  </p:cSld>
+  <p:clrMapOvr>
+    <a:masterClrMapping/>
+  </p:clrMapOvr>
+</p:sld>
+</file>
+
+<file path=ppt/slides/slide8.xml><?xml version="1.0" encoding="utf-8"?>
+<p:sld xmlns:a="http://schemas.openxmlformats.org/drawingml/2006/main" xmlns:r="http://schemas.openxmlformats.org/officeDocument/2006/relationships" xmlns:p="http://schemas.openxmlformats.org/presentationml/2006/main">
+  <p:cSld>
+    <p:spTree>
+      <p:nvGrpSpPr>
+        <p:cNvPr id="1" name=""/>
+        <p:cNvGrpSpPr/>
+        <p:nvPr/>
+      </p:nvGrpSpPr>
+      <p:grpSpPr>
+        <a:xfrm>
+          <a:off x="0" y="0"/>
+          <a:ext cx="0" cy="0"/>
+          <a:chOff x="0" y="0"/>
+          <a:chExt cx="0" cy="0"/>
+        </a:xfrm>
+      </p:grpSpPr>
+      <p:sp>
+        <p:nvSpPr>
+          <p:cNvPr id="2" name="Title 1"/>
+          <p:cNvSpPr>
+            <a:spLocks noGrp="1"/>
+          </p:cNvSpPr>
+          <p:nvPr>
+            <p:ph type="title"/>
+          </p:nvPr>
+        </p:nvSpPr>
+        <p:spPr>
+          <a:xfrm>
+            <a:off x="668267" y="300389"/>
+            <a:ext cx="10515600" cy="605919"/>
+          </a:xfrm>
+        </p:spPr>
+        <p:txBody>
+          <a:bodyPr>
+            <a:normAutofit/>
+          </a:bodyPr>
+          <a:lstStyle/>
+          <a:p>
+            <a:pPr algn="ctr"/>
+            <a:r>
+              <a:rPr lang="en-US" sz="3200" b="1" dirty="0" smtClean="0">
+                <a:latin typeface="+mn-lt"/>
+              </a:rPr>
+              <a:t>Credit Cards</a:t>
+            </a:r>
+            <a:endParaRPr lang="en-US" sz="3200" b="1" dirty="0">
+              <a:latin typeface="+mn-lt"/>
+            </a:endParaRPr>
+          </a:p>
+        </p:txBody>
+      </p:sp>
+      <p:pic>
+        <p:nvPicPr>
+          <p:cNvPr id="3" name="Picture 2"/>
+          <p:cNvPicPr>
+            <a:picLocks noChangeAspect="1"/>
+          </p:cNvPicPr>
+          <p:nvPr/>
+        </p:nvPicPr>
+        <p:blipFill rotWithShape="1">
+          <a:blip r:embed="rId2">
+            <a:extLst>
+              <a:ext uri="{28A0092B-C50C-407E-A947-70E740481C1C}">
+                <a14:useLocalDpi xmlns:a14="http://schemas.microsoft.com/office/drawing/2010/main" val="0"/>
+              </a:ext>
+            </a:extLst>
+          </a:blip>
+          <a:srcRect l="79355" t="7197" r="-1621" b="30620"/>
+          <a:stretch/>
+        </p:blipFill>
+        <p:spPr>
+          <a:xfrm>
+            <a:off x="3139709" y="1173345"/>
+            <a:ext cx="1618407" cy="4264504"/>
+          </a:xfrm>
+          <a:prstGeom prst="rect">
+            <a:avLst/>
+          </a:prstGeom>
+        </p:spPr>
+      </p:pic>
+      <p:pic>
+        <p:nvPicPr>
+          <p:cNvPr id="4" name="Picture 3"/>
+          <p:cNvPicPr>
+            <a:picLocks noChangeAspect="1"/>
+          </p:cNvPicPr>
+          <p:nvPr/>
+        </p:nvPicPr>
+        <p:blipFill rotWithShape="1">
+          <a:blip r:embed="rId3">
+            <a:extLst>
+              <a:ext uri="{28A0092B-C50C-407E-A947-70E740481C1C}">
+                <a14:useLocalDpi xmlns:a14="http://schemas.microsoft.com/office/drawing/2010/main" val="0"/>
+              </a:ext>
+            </a:extLst>
+          </a:blip>
+          <a:srcRect t="64028"/>
+          <a:stretch/>
+        </p:blipFill>
+        <p:spPr>
+          <a:xfrm>
+            <a:off x="5784168" y="2346689"/>
+            <a:ext cx="6466114" cy="2464025"/>
+          </a:xfrm>
+          <a:prstGeom prst="rect">
+            <a:avLst/>
+          </a:prstGeom>
+        </p:spPr>
+      </p:pic>
+    </p:spTree>
+    <p:extLst>
+      <p:ext uri="{BB962C8B-B14F-4D97-AF65-F5344CB8AC3E}">
+        <p14:creationId xmlns:p14="http://schemas.microsoft.com/office/powerpoint/2010/main" val="1828239924"/>
       </p:ext>
     </p:extLst>
   </p:cSld>

</xml_diff>

<commit_message>
slides pretty much done
</commit_message>
<xml_diff>
--- a/Data Inceptionists.pptx
+++ b/Data Inceptionists.pptx
@@ -13,6 +13,7 @@
     <p:sldId id="261" r:id="rId7"/>
     <p:sldId id="262" r:id="rId8"/>
     <p:sldId id="263" r:id="rId9"/>
+    <p:sldId id="264" r:id="rId10"/>
   </p:sldIdLst>
   <p:sldSz cx="12192000" cy="6858000"/>
   <p:notesSz cx="6858000" cy="9144000"/>
@@ -3934,6 +3935,291 @@
 </p:sld>
 </file>
 
+<file path=ppt/slides/slide9.xml><?xml version="1.0" encoding="utf-8"?>
+<p:sld xmlns:a="http://schemas.openxmlformats.org/drawingml/2006/main" xmlns:r="http://schemas.openxmlformats.org/officeDocument/2006/relationships" xmlns:p="http://schemas.openxmlformats.org/presentationml/2006/main">
+  <p:cSld>
+    <p:spTree>
+      <p:nvGrpSpPr>
+        <p:cNvPr id="1" name=""/>
+        <p:cNvGrpSpPr/>
+        <p:nvPr/>
+      </p:nvGrpSpPr>
+      <p:grpSpPr>
+        <a:xfrm>
+          <a:off x="0" y="0"/>
+          <a:ext cx="0" cy="0"/>
+          <a:chOff x="0" y="0"/>
+          <a:chExt cx="0" cy="0"/>
+        </a:xfrm>
+      </p:grpSpPr>
+      <p:sp>
+        <p:nvSpPr>
+          <p:cNvPr id="2" name="Title 1"/>
+          <p:cNvSpPr>
+            <a:spLocks noGrp="1"/>
+          </p:cNvSpPr>
+          <p:nvPr>
+            <p:ph type="title"/>
+          </p:nvPr>
+        </p:nvSpPr>
+        <p:spPr>
+          <a:xfrm>
+            <a:off x="838200" y="365126"/>
+            <a:ext cx="10515600" cy="694932"/>
+          </a:xfrm>
+        </p:spPr>
+        <p:txBody>
+          <a:bodyPr>
+            <a:normAutofit/>
+          </a:bodyPr>
+          <a:lstStyle/>
+          <a:p>
+            <a:pPr algn="ctr"/>
+            <a:r>
+              <a:rPr lang="en-US" sz="3200" b="1" dirty="0" smtClean="0">
+                <a:latin typeface="+mn-lt"/>
+              </a:rPr>
+              <a:t>Planned Implementation Tools</a:t>
+            </a:r>
+            <a:endParaRPr lang="en-US" sz="3200" b="1" dirty="0">
+              <a:latin typeface="+mn-lt"/>
+            </a:endParaRPr>
+          </a:p>
+        </p:txBody>
+      </p:sp>
+      <p:sp>
+        <p:nvSpPr>
+          <p:cNvPr id="3" name="TextBox 2"/>
+          <p:cNvSpPr txBox="1"/>
+          <p:nvPr/>
+        </p:nvSpPr>
+        <p:spPr>
+          <a:xfrm>
+            <a:off x="1100517" y="1300110"/>
+            <a:ext cx="2565175" cy="1200329"/>
+          </a:xfrm>
+          <a:prstGeom prst="rect">
+            <a:avLst/>
+          </a:prstGeom>
+          <a:noFill/>
+        </p:spPr>
+        <p:txBody>
+          <a:bodyPr wrap="square" rtlCol="0">
+            <a:spAutoFit/>
+          </a:bodyPr>
+          <a:lstStyle/>
+          <a:p>
+            <a:r>
+              <a:rPr lang="en-US" dirty="0" smtClean="0"/>
+              <a:t>MySQL:</a:t>
+            </a:r>
+          </a:p>
+          <a:p>
+            <a:pPr marL="285750" indent="-285750">
+              <a:buFont typeface="Arial" panose="020B0604020202020204" pitchFamily="34" charset="0"/>
+              <a:buChar char="•"/>
+            </a:pPr>
+            <a:r>
+              <a:rPr lang="en-US" dirty="0" smtClean="0"/>
+              <a:t>Free</a:t>
+            </a:r>
+          </a:p>
+          <a:p>
+            <a:pPr marL="285750" indent="-285750">
+              <a:buFont typeface="Arial" panose="020B0604020202020204" pitchFamily="34" charset="0"/>
+              <a:buChar char="•"/>
+            </a:pPr>
+            <a:r>
+              <a:rPr lang="en-US" dirty="0" smtClean="0"/>
+              <a:t>Easy to use</a:t>
+            </a:r>
+          </a:p>
+          <a:p>
+            <a:pPr marL="285750" indent="-285750">
+              <a:buFont typeface="Arial" panose="020B0604020202020204" pitchFamily="34" charset="0"/>
+              <a:buChar char="•"/>
+            </a:pPr>
+            <a:r>
+              <a:rPr lang="en-US" dirty="0" smtClean="0"/>
+              <a:t>Scales </a:t>
+            </a:r>
+            <a:r>
+              <a:rPr lang="en-US" u="sng" dirty="0" smtClean="0"/>
+              <a:t>very</a:t>
+            </a:r>
+            <a:r>
+              <a:rPr lang="en-US" dirty="0" smtClean="0"/>
+              <a:t> poorly</a:t>
+            </a:r>
+            <a:endParaRPr lang="en-US" dirty="0"/>
+          </a:p>
+        </p:txBody>
+      </p:sp>
+      <p:sp>
+        <p:nvSpPr>
+          <p:cNvPr id="4" name="TextBox 3"/>
+          <p:cNvSpPr txBox="1"/>
+          <p:nvPr/>
+        </p:nvSpPr>
+        <p:spPr>
+          <a:xfrm>
+            <a:off x="3050697" y="2623689"/>
+            <a:ext cx="3762797" cy="923330"/>
+          </a:xfrm>
+          <a:prstGeom prst="rect">
+            <a:avLst/>
+          </a:prstGeom>
+          <a:noFill/>
+        </p:spPr>
+        <p:txBody>
+          <a:bodyPr wrap="square" rtlCol="0">
+            <a:spAutoFit/>
+          </a:bodyPr>
+          <a:lstStyle/>
+          <a:p>
+            <a:r>
+              <a:rPr lang="en-US" dirty="0" smtClean="0"/>
+              <a:t>Java(for the backend):</a:t>
+            </a:r>
+          </a:p>
+          <a:p>
+            <a:pPr marL="285750" indent="-285750">
+              <a:buFont typeface="Arial" panose="020B0604020202020204" pitchFamily="34" charset="0"/>
+              <a:buChar char="•"/>
+            </a:pPr>
+            <a:r>
+              <a:rPr lang="en-US" dirty="0" smtClean="0"/>
+              <a:t>Familiarity</a:t>
+            </a:r>
+          </a:p>
+          <a:p>
+            <a:pPr marL="285750" indent="-285750">
+              <a:buFont typeface="Arial" panose="020B0604020202020204" pitchFamily="34" charset="0"/>
+              <a:buChar char="•"/>
+            </a:pPr>
+            <a:r>
+              <a:rPr lang="en-US" dirty="0" smtClean="0"/>
+              <a:t>Integrates well with web</a:t>
+            </a:r>
+            <a:endParaRPr lang="en-US" dirty="0"/>
+          </a:p>
+        </p:txBody>
+      </p:sp>
+      <p:sp>
+        <p:nvSpPr>
+          <p:cNvPr id="5" name="TextBox 4"/>
+          <p:cNvSpPr txBox="1"/>
+          <p:nvPr/>
+        </p:nvSpPr>
+        <p:spPr>
+          <a:xfrm>
+            <a:off x="5534953" y="3605533"/>
+            <a:ext cx="3859900" cy="1200329"/>
+          </a:xfrm>
+          <a:prstGeom prst="rect">
+            <a:avLst/>
+          </a:prstGeom>
+          <a:noFill/>
+        </p:spPr>
+        <p:txBody>
+          <a:bodyPr wrap="square" rtlCol="0">
+            <a:spAutoFit/>
+          </a:bodyPr>
+          <a:lstStyle/>
+          <a:p>
+            <a:r>
+              <a:rPr lang="en-US" dirty="0" smtClean="0"/>
+              <a:t>Prepared Statements:</a:t>
+            </a:r>
+          </a:p>
+          <a:p>
+            <a:pPr marL="285750" indent="-285750">
+              <a:buFont typeface="Arial" panose="020B0604020202020204" pitchFamily="34" charset="0"/>
+              <a:buChar char="•"/>
+            </a:pPr>
+            <a:r>
+              <a:rPr lang="en-US" dirty="0" smtClean="0"/>
+              <a:t>Faster than using regular SQL queries</a:t>
+            </a:r>
+          </a:p>
+          <a:p>
+            <a:pPr marL="285750" indent="-285750">
+              <a:buFont typeface="Arial" panose="020B0604020202020204" pitchFamily="34" charset="0"/>
+              <a:buChar char="•"/>
+            </a:pPr>
+            <a:r>
+              <a:rPr lang="en-US" dirty="0" smtClean="0"/>
+              <a:t>Defends against SQL injection</a:t>
+            </a:r>
+            <a:endParaRPr lang="en-US" dirty="0"/>
+          </a:p>
+        </p:txBody>
+      </p:sp>
+      <p:sp>
+        <p:nvSpPr>
+          <p:cNvPr id="6" name="TextBox 5"/>
+          <p:cNvSpPr txBox="1"/>
+          <p:nvPr/>
+        </p:nvSpPr>
+        <p:spPr>
+          <a:xfrm>
+            <a:off x="8796042" y="5122258"/>
+            <a:ext cx="3301551" cy="646331"/>
+          </a:xfrm>
+          <a:prstGeom prst="rect">
+            <a:avLst/>
+          </a:prstGeom>
+          <a:noFill/>
+        </p:spPr>
+        <p:txBody>
+          <a:bodyPr wrap="square" rtlCol="0">
+            <a:spAutoFit/>
+          </a:bodyPr>
+          <a:lstStyle/>
+          <a:p>
+            <a:r>
+              <a:rPr lang="en-US" dirty="0" smtClean="0"/>
+              <a:t>Python/Ruby (frontend scripting)</a:t>
+            </a:r>
+          </a:p>
+          <a:p>
+            <a:pPr marL="285750" indent="-285750">
+              <a:buFont typeface="Arial" panose="020B0604020202020204" pitchFamily="34" charset="0"/>
+              <a:buChar char="•"/>
+            </a:pPr>
+            <a:r>
+              <a:rPr lang="en-US" dirty="0" smtClean="0"/>
+              <a:t>Easier than </a:t>
+            </a:r>
+            <a:r>
+              <a:rPr lang="en-US" dirty="0" err="1" smtClean="0"/>
+              <a:t>javascript</a:t>
+            </a:r>
+            <a:r>
+              <a:rPr lang="en-US" dirty="0" smtClean="0"/>
+              <a:t>/</a:t>
+            </a:r>
+            <a:r>
+              <a:rPr lang="en-US" dirty="0" err="1" smtClean="0"/>
+              <a:t>php</a:t>
+            </a:r>
+            <a:endParaRPr lang="en-US" dirty="0"/>
+          </a:p>
+        </p:txBody>
+      </p:sp>
+    </p:spTree>
+    <p:extLst>
+      <p:ext uri="{BB962C8B-B14F-4D97-AF65-F5344CB8AC3E}">
+        <p14:creationId xmlns:p14="http://schemas.microsoft.com/office/powerpoint/2010/main" val="930580477"/>
+      </p:ext>
+    </p:extLst>
+  </p:cSld>
+  <p:clrMapOvr>
+    <a:masterClrMapping/>
+  </p:clrMapOvr>
+</p:sld>
+</file>
+
 <file path=ppt/theme/theme1.xml><?xml version="1.0" encoding="utf-8"?>
 <a:theme xmlns:a="http://schemas.openxmlformats.org/drawingml/2006/main" name="Office Theme">
   <a:themeElements>

</xml_diff>

<commit_message>
added shipping apis to powerpoint
</commit_message>
<xml_diff>
--- a/Data Inceptionists.pptx
+++ b/Data Inceptionists.pptx
@@ -3995,7 +3995,7 @@
         </p:nvSpPr>
         <p:spPr>
           <a:xfrm>
-            <a:off x="1100517" y="1300110"/>
+            <a:off x="372234" y="1060058"/>
             <a:ext cx="2565175" cy="1200329"/>
           </a:xfrm>
           <a:prstGeom prst="rect">
@@ -4063,7 +4063,7 @@
         </p:nvSpPr>
         <p:spPr>
           <a:xfrm>
-            <a:off x="3050697" y="2623689"/>
+            <a:off x="2176757" y="2381573"/>
             <a:ext cx="3762797" cy="923330"/>
           </a:xfrm>
           <a:prstGeom prst="rect">
@@ -4113,7 +4113,7 @@
         </p:nvSpPr>
         <p:spPr>
           <a:xfrm>
-            <a:off x="5534953" y="3605533"/>
+            <a:off x="4166050" y="3304903"/>
             <a:ext cx="3859900" cy="1200329"/>
           </a:xfrm>
           <a:prstGeom prst="rect">
@@ -4163,8 +4163,8 @@
         </p:nvSpPr>
         <p:spPr>
           <a:xfrm>
-            <a:off x="8796042" y="5122258"/>
-            <a:ext cx="3301551" cy="646331"/>
+            <a:off x="6375174" y="4693380"/>
+            <a:ext cx="3432373" cy="646331"/>
           </a:xfrm>
           <a:prstGeom prst="rect">
             <a:avLst/>
@@ -4179,8 +4179,13 @@
           <a:p>
             <a:r>
               <a:rPr lang="en-US" dirty="0" smtClean="0"/>
-              <a:t>Python/Ruby (frontend scripting)</a:t>
-            </a:r>
+              <a:t>Python/Ruby (frontend scripting</a:t>
+            </a:r>
+            <a:r>
+              <a:rPr lang="en-US" dirty="0" smtClean="0"/>
+              <a:t>):</a:t>
+            </a:r>
+            <a:endParaRPr lang="en-US" dirty="0" smtClean="0"/>
           </a:p>
           <a:p>
             <a:pPr marL="285750" indent="-285750">
@@ -4202,6 +4207,46 @@
             <a:r>
               <a:rPr lang="en-US" dirty="0" err="1" smtClean="0"/>
               <a:t>php</a:t>
+            </a:r>
+            <a:endParaRPr lang="en-US" dirty="0"/>
+          </a:p>
+        </p:txBody>
+      </p:sp>
+      <p:sp>
+        <p:nvSpPr>
+          <p:cNvPr id="7" name="TextBox 6"/>
+          <p:cNvSpPr txBox="1"/>
+          <p:nvPr/>
+        </p:nvSpPr>
+        <p:spPr>
+          <a:xfrm>
+            <a:off x="8796042" y="5462124"/>
+            <a:ext cx="3220631" cy="1200329"/>
+          </a:xfrm>
+          <a:prstGeom prst="rect">
+            <a:avLst/>
+          </a:prstGeom>
+          <a:noFill/>
+        </p:spPr>
+        <p:txBody>
+          <a:bodyPr wrap="square" rtlCol="0">
+            <a:spAutoFit/>
+          </a:bodyPr>
+          <a:lstStyle/>
+          <a:p>
+            <a:r>
+              <a:rPr lang="en-US" dirty="0" smtClean="0"/>
+              <a:t>FedEx/UPS APIs:</a:t>
+            </a:r>
+          </a:p>
+          <a:p>
+            <a:pPr marL="285750" indent="-285750">
+              <a:buFont typeface="Arial" panose="020B0604020202020204" pitchFamily="34" charset="0"/>
+              <a:buChar char="•"/>
+            </a:pPr>
+            <a:r>
+              <a:rPr lang="en-US" dirty="0" smtClean="0"/>
+              <a:t>Generate labels automatically to make shipping easier for users</a:t>
             </a:r>
             <a:endParaRPr lang="en-US" dirty="0"/>
           </a:p>

</xml_diff>